<commit_message>
updated README:: added software flow diagram
</commit_message>
<xml_diff>
--- a/Images/diagrams.pptx
+++ b/Images/diagrams.pptx
@@ -107,6 +107,11 @@
       </a:defRPr>
     </a:lvl9pPr>
   </p:defaultTextStyle>
+  <p:extLst>
+    <p:ext uri="{EFAFB233-063F-42B5-8137-9DF3F51BA10A}">
+      <p15:sldGuideLst xmlns:p15="http://schemas.microsoft.com/office/powerpoint/2012/main"/>
+    </p:ext>
+  </p:extLst>
 </p:presentation>
 </file>
 
@@ -259,7 +264,7 @@
           <a:p>
             <a:fld id="{43AE6D25-7305-4F8F-A793-FFF4666B6C47}" type="datetimeFigureOut">
               <a:rPr lang="en-IN" smtClean="0"/>
-              <a:t>29-10-2024</a:t>
+              <a:t>07-11-2024</a:t>
             </a:fld>
             <a:endParaRPr lang="en-IN"/>
           </a:p>
@@ -459,7 +464,7 @@
           <a:p>
             <a:fld id="{43AE6D25-7305-4F8F-A793-FFF4666B6C47}" type="datetimeFigureOut">
               <a:rPr lang="en-IN" smtClean="0"/>
-              <a:t>29-10-2024</a:t>
+              <a:t>07-11-2024</a:t>
             </a:fld>
             <a:endParaRPr lang="en-IN"/>
           </a:p>
@@ -669,7 +674,7 @@
           <a:p>
             <a:fld id="{43AE6D25-7305-4F8F-A793-FFF4666B6C47}" type="datetimeFigureOut">
               <a:rPr lang="en-IN" smtClean="0"/>
-              <a:t>29-10-2024</a:t>
+              <a:t>07-11-2024</a:t>
             </a:fld>
             <a:endParaRPr lang="en-IN"/>
           </a:p>
@@ -869,7 +874,7 @@
           <a:p>
             <a:fld id="{43AE6D25-7305-4F8F-A793-FFF4666B6C47}" type="datetimeFigureOut">
               <a:rPr lang="en-IN" smtClean="0"/>
-              <a:t>29-10-2024</a:t>
+              <a:t>07-11-2024</a:t>
             </a:fld>
             <a:endParaRPr lang="en-IN"/>
           </a:p>
@@ -1145,7 +1150,7 @@
           <a:p>
             <a:fld id="{43AE6D25-7305-4F8F-A793-FFF4666B6C47}" type="datetimeFigureOut">
               <a:rPr lang="en-IN" smtClean="0"/>
-              <a:t>29-10-2024</a:t>
+              <a:t>07-11-2024</a:t>
             </a:fld>
             <a:endParaRPr lang="en-IN"/>
           </a:p>
@@ -1413,7 +1418,7 @@
           <a:p>
             <a:fld id="{43AE6D25-7305-4F8F-A793-FFF4666B6C47}" type="datetimeFigureOut">
               <a:rPr lang="en-IN" smtClean="0"/>
-              <a:t>29-10-2024</a:t>
+              <a:t>07-11-2024</a:t>
             </a:fld>
             <a:endParaRPr lang="en-IN"/>
           </a:p>
@@ -1828,7 +1833,7 @@
           <a:p>
             <a:fld id="{43AE6D25-7305-4F8F-A793-FFF4666B6C47}" type="datetimeFigureOut">
               <a:rPr lang="en-IN" smtClean="0"/>
-              <a:t>29-10-2024</a:t>
+              <a:t>07-11-2024</a:t>
             </a:fld>
             <a:endParaRPr lang="en-IN"/>
           </a:p>
@@ -1970,7 +1975,7 @@
           <a:p>
             <a:fld id="{43AE6D25-7305-4F8F-A793-FFF4666B6C47}" type="datetimeFigureOut">
               <a:rPr lang="en-IN" smtClean="0"/>
-              <a:t>29-10-2024</a:t>
+              <a:t>07-11-2024</a:t>
             </a:fld>
             <a:endParaRPr lang="en-IN"/>
           </a:p>
@@ -2083,7 +2088,7 @@
           <a:p>
             <a:fld id="{43AE6D25-7305-4F8F-A793-FFF4666B6C47}" type="datetimeFigureOut">
               <a:rPr lang="en-IN" smtClean="0"/>
-              <a:t>29-10-2024</a:t>
+              <a:t>07-11-2024</a:t>
             </a:fld>
             <a:endParaRPr lang="en-IN"/>
           </a:p>
@@ -2396,7 +2401,7 @@
           <a:p>
             <a:fld id="{43AE6D25-7305-4F8F-A793-FFF4666B6C47}" type="datetimeFigureOut">
               <a:rPr lang="en-IN" smtClean="0"/>
-              <a:t>29-10-2024</a:t>
+              <a:t>07-11-2024</a:t>
             </a:fld>
             <a:endParaRPr lang="en-IN"/>
           </a:p>
@@ -2685,7 +2690,7 @@
           <a:p>
             <a:fld id="{43AE6D25-7305-4F8F-A793-FFF4666B6C47}" type="datetimeFigureOut">
               <a:rPr lang="en-IN" smtClean="0"/>
-              <a:t>29-10-2024</a:t>
+              <a:t>07-11-2024</a:t>
             </a:fld>
             <a:endParaRPr lang="en-IN"/>
           </a:p>
@@ -2928,7 +2933,7 @@
           <a:p>
             <a:fld id="{43AE6D25-7305-4F8F-A793-FFF4666B6C47}" type="datetimeFigureOut">
               <a:rPr lang="en-IN" smtClean="0"/>
-              <a:t>29-10-2024</a:t>
+              <a:t>07-11-2024</a:t>
             </a:fld>
             <a:endParaRPr lang="en-IN"/>
           </a:p>
@@ -4694,6 +4699,1515 @@
           <a:chExt cx="0" cy="0"/>
         </a:xfrm>
       </p:grpSpPr>
+      <p:sp>
+        <p:nvSpPr>
+          <p:cNvPr id="2" name="Rectangle 1">
+            <a:extLst>
+              <a:ext uri="{FF2B5EF4-FFF2-40B4-BE49-F238E27FC236}">
+                <a16:creationId xmlns:a16="http://schemas.microsoft.com/office/drawing/2014/main" id="{F3399C5C-A9E7-B5D1-C455-0C3BE013C1D4}"/>
+              </a:ext>
+            </a:extLst>
+          </p:cNvPr>
+          <p:cNvSpPr/>
+          <p:nvPr/>
+        </p:nvSpPr>
+        <p:spPr>
+          <a:xfrm>
+            <a:off x="4463845" y="167146"/>
+            <a:ext cx="2222090" cy="560439"/>
+          </a:xfrm>
+          <a:prstGeom prst="rect">
+            <a:avLst/>
+          </a:prstGeom>
+        </p:spPr>
+        <p:style>
+          <a:lnRef idx="1">
+            <a:schemeClr val="accent1"/>
+          </a:lnRef>
+          <a:fillRef idx="2">
+            <a:schemeClr val="accent1"/>
+          </a:fillRef>
+          <a:effectRef idx="1">
+            <a:schemeClr val="accent1"/>
+          </a:effectRef>
+          <a:fontRef idx="minor">
+            <a:schemeClr val="dk1"/>
+          </a:fontRef>
+        </p:style>
+        <p:txBody>
+          <a:bodyPr rtlCol="0" anchor="ctr"/>
+          <a:lstStyle/>
+          <a:p>
+            <a:pPr algn="ctr"/>
+            <a:r>
+              <a:rPr lang="en-IN" dirty="0">
+                <a:latin typeface="LM Roman 10" panose="00000500000000000000" pitchFamily="50" charset="0"/>
+              </a:rPr>
+              <a:t>Initialisations</a:t>
+            </a:r>
+          </a:p>
+        </p:txBody>
+      </p:sp>
+      <p:sp>
+        <p:nvSpPr>
+          <p:cNvPr id="4" name="Rectangle 3">
+            <a:extLst>
+              <a:ext uri="{FF2B5EF4-FFF2-40B4-BE49-F238E27FC236}">
+                <a16:creationId xmlns:a16="http://schemas.microsoft.com/office/drawing/2014/main" id="{33EDFBE2-A024-AA1F-ACD4-A686CB528352}"/>
+              </a:ext>
+            </a:extLst>
+          </p:cNvPr>
+          <p:cNvSpPr/>
+          <p:nvPr/>
+        </p:nvSpPr>
+        <p:spPr>
+          <a:xfrm>
+            <a:off x="4463845" y="1071714"/>
+            <a:ext cx="2222090" cy="560439"/>
+          </a:xfrm>
+          <a:prstGeom prst="rect">
+            <a:avLst/>
+          </a:prstGeom>
+        </p:spPr>
+        <p:style>
+          <a:lnRef idx="1">
+            <a:schemeClr val="accent4"/>
+          </a:lnRef>
+          <a:fillRef idx="2">
+            <a:schemeClr val="accent4"/>
+          </a:fillRef>
+          <a:effectRef idx="1">
+            <a:schemeClr val="accent4"/>
+          </a:effectRef>
+          <a:fontRef idx="minor">
+            <a:schemeClr val="dk1"/>
+          </a:fontRef>
+        </p:style>
+        <p:txBody>
+          <a:bodyPr rtlCol="0" anchor="ctr"/>
+          <a:lstStyle/>
+          <a:p>
+            <a:pPr algn="ctr"/>
+            <a:r>
+              <a:rPr lang="en-IN" dirty="0">
+                <a:latin typeface="LM Mono 10" panose="00000509000000000000" pitchFamily="49" charset="0"/>
+              </a:rPr>
+              <a:t>Trig</a:t>
+            </a:r>
+            <a:r>
+              <a:rPr lang="en-IN" dirty="0">
+                <a:latin typeface="LM Roman 10" panose="00000500000000000000" pitchFamily="50" charset="0"/>
+              </a:rPr>
+              <a:t> = 1 </a:t>
+            </a:r>
+          </a:p>
+        </p:txBody>
+      </p:sp>
+      <p:sp>
+        <p:nvSpPr>
+          <p:cNvPr id="5" name="Rectangle 4">
+            <a:extLst>
+              <a:ext uri="{FF2B5EF4-FFF2-40B4-BE49-F238E27FC236}">
+                <a16:creationId xmlns:a16="http://schemas.microsoft.com/office/drawing/2014/main" id="{705D8C1E-FF67-2CBF-73CD-BBC515F1BC59}"/>
+              </a:ext>
+            </a:extLst>
+          </p:cNvPr>
+          <p:cNvSpPr/>
+          <p:nvPr/>
+        </p:nvSpPr>
+        <p:spPr>
+          <a:xfrm>
+            <a:off x="4463845" y="3716599"/>
+            <a:ext cx="2222090" cy="653832"/>
+          </a:xfrm>
+          <a:prstGeom prst="rect">
+            <a:avLst/>
+          </a:prstGeom>
+        </p:spPr>
+        <p:style>
+          <a:lnRef idx="1">
+            <a:schemeClr val="accent4"/>
+          </a:lnRef>
+          <a:fillRef idx="2">
+            <a:schemeClr val="accent4"/>
+          </a:fillRef>
+          <a:effectRef idx="1">
+            <a:schemeClr val="accent4"/>
+          </a:effectRef>
+          <a:fontRef idx="minor">
+            <a:schemeClr val="dk1"/>
+          </a:fontRef>
+        </p:style>
+        <p:txBody>
+          <a:bodyPr rtlCol="0" anchor="ctr"/>
+          <a:lstStyle/>
+          <a:p>
+            <a:pPr algn="ctr"/>
+            <a:r>
+              <a:rPr lang="en-IN" dirty="0">
+                <a:latin typeface="LM Roman 10" panose="00000500000000000000" pitchFamily="50" charset="0"/>
+              </a:rPr>
+              <a:t>Wait(min(</a:t>
+            </a:r>
+            <a:r>
+              <a:rPr lang="en-IN" dirty="0">
+                <a:latin typeface="LM Mono 10" panose="00000509000000000000" pitchFamily="49" charset="0"/>
+              </a:rPr>
+              <a:t>echo</a:t>
+            </a:r>
+            <a:r>
+              <a:rPr lang="en-IN" dirty="0">
+                <a:latin typeface="LM Roman 10" panose="00000500000000000000" pitchFamily="50" charset="0"/>
+              </a:rPr>
+              <a:t>=1), </a:t>
+            </a:r>
+            <a:r>
+              <a:rPr lang="en-IN" dirty="0" err="1">
+                <a:latin typeface="LM Mono 10" panose="00000509000000000000" pitchFamily="49" charset="0"/>
+              </a:rPr>
+              <a:t>count_max</a:t>
+            </a:r>
+            <a:r>
+              <a:rPr lang="en-IN" dirty="0">
+                <a:latin typeface="LM Roman 10" panose="00000500000000000000" pitchFamily="50" charset="0"/>
+              </a:rPr>
+              <a:t>)</a:t>
+            </a:r>
+          </a:p>
+        </p:txBody>
+      </p:sp>
+      <mc:AlternateContent xmlns:mc="http://schemas.openxmlformats.org/markup-compatibility/2006">
+        <mc:Choice xmlns:a14="http://schemas.microsoft.com/office/drawing/2010/main" Requires="a14">
+          <p:sp>
+            <p:nvSpPr>
+              <p:cNvPr id="6" name="Rectangle 5">
+                <a:extLst>
+                  <a:ext uri="{FF2B5EF4-FFF2-40B4-BE49-F238E27FC236}">
+                    <a16:creationId xmlns:a16="http://schemas.microsoft.com/office/drawing/2014/main" id="{1C7E01DE-19FC-C6C8-C8FA-904825B7BA8D}"/>
+                  </a:ext>
+                </a:extLst>
+              </p:cNvPr>
+              <p:cNvSpPr/>
+              <p:nvPr/>
+            </p:nvSpPr>
+            <p:spPr>
+              <a:xfrm>
+                <a:off x="7015317" y="3483075"/>
+                <a:ext cx="2222090" cy="980770"/>
+              </a:xfrm>
+              <a:prstGeom prst="rect">
+                <a:avLst/>
+              </a:prstGeom>
+            </p:spPr>
+            <p:style>
+              <a:lnRef idx="1">
+                <a:schemeClr val="accent6"/>
+              </a:lnRef>
+              <a:fillRef idx="2">
+                <a:schemeClr val="accent6"/>
+              </a:fillRef>
+              <a:effectRef idx="1">
+                <a:schemeClr val="accent6"/>
+              </a:effectRef>
+              <a:fontRef idx="minor">
+                <a:schemeClr val="dk1"/>
+              </a:fontRef>
+            </p:style>
+            <p:txBody>
+              <a:bodyPr rtlCol="0" anchor="ctr"/>
+              <a:lstStyle/>
+              <a:p>
+                <a:pPr algn="ctr"/>
+                <a:r>
+                  <a:rPr lang="en-IN" dirty="0">
+                    <a:latin typeface="LM Roman 10" panose="00000500000000000000" pitchFamily="50" charset="0"/>
+                  </a:rPr>
+                  <a:t>Counter</a:t>
+                </a:r>
+              </a:p>
+              <a:p>
+                <a:pPr algn="ctr"/>
+                <a:r>
+                  <a:rPr lang="en-IN" dirty="0">
+                    <a:latin typeface="LM Roman 10" panose="00000500000000000000" pitchFamily="50" charset="0"/>
+                  </a:rPr>
+                  <a:t>Output = </a:t>
+                </a:r>
+                <a14:m>
+                  <m:oMath xmlns:m="http://schemas.openxmlformats.org/officeDocument/2006/math">
+                    <m:r>
+                      <a:rPr lang="en-IN" b="0" i="1" smtClean="0">
+                        <a:latin typeface="Cambria Math" panose="02040503050406030204" pitchFamily="18" charset="0"/>
+                      </a:rPr>
+                      <m:t>𝑡</m:t>
+                    </m:r>
+                  </m:oMath>
+                </a14:m>
+                <a:r>
+                  <a:rPr lang="en-IN" dirty="0">
+                    <a:latin typeface="LM Roman 10" panose="00000500000000000000" pitchFamily="50" charset="0"/>
+                  </a:rPr>
+                  <a:t> </a:t>
+                </a:r>
+              </a:p>
+              <a:p>
+                <a:pPr algn="ctr"/>
+                <a:r>
+                  <a:rPr lang="en-IN" dirty="0">
+                    <a:latin typeface="LM Roman 10" panose="00000500000000000000" pitchFamily="50" charset="0"/>
+                  </a:rPr>
+                  <a:t>(in secs) </a:t>
+                </a:r>
+              </a:p>
+            </p:txBody>
+          </p:sp>
+        </mc:Choice>
+        <mc:Fallback>
+          <p:sp>
+            <p:nvSpPr>
+              <p:cNvPr id="6" name="Rectangle 5">
+                <a:extLst>
+                  <a:ext uri="{FF2B5EF4-FFF2-40B4-BE49-F238E27FC236}">
+                    <a16:creationId xmlns:a16="http://schemas.microsoft.com/office/drawing/2014/main" id="{1C7E01DE-19FC-C6C8-C8FA-904825B7BA8D}"/>
+                  </a:ext>
+                </a:extLst>
+              </p:cNvPr>
+              <p:cNvSpPr>
+                <a:spLocks noRot="1" noChangeAspect="1" noMove="1" noResize="1" noEditPoints="1" noAdjustHandles="1" noChangeArrowheads="1" noChangeShapeType="1" noTextEdit="1"/>
+              </p:cNvSpPr>
+              <p:nvPr/>
+            </p:nvSpPr>
+            <p:spPr>
+              <a:xfrm>
+                <a:off x="7015317" y="3483075"/>
+                <a:ext cx="2222090" cy="980770"/>
+              </a:xfrm>
+              <a:prstGeom prst="rect">
+                <a:avLst/>
+              </a:prstGeom>
+              <a:blipFill>
+                <a:blip r:embed="rId2"/>
+                <a:stretch>
+                  <a:fillRect b="-6173"/>
+                </a:stretch>
+              </a:blipFill>
+            </p:spPr>
+            <p:txBody>
+              <a:bodyPr/>
+              <a:lstStyle/>
+              <a:p>
+                <a:r>
+                  <a:rPr lang="en-IN">
+                    <a:noFill/>
+                  </a:rPr>
+                  <a:t> </a:t>
+                </a:r>
+              </a:p>
+            </p:txBody>
+          </p:sp>
+        </mc:Fallback>
+      </mc:AlternateContent>
+      <mc:AlternateContent xmlns:mc="http://schemas.openxmlformats.org/markup-compatibility/2006">
+        <mc:Choice xmlns:a14="http://schemas.microsoft.com/office/drawing/2010/main" Requires="a14">
+          <p:sp>
+            <p:nvSpPr>
+              <p:cNvPr id="7" name="Rectangle 6">
+                <a:extLst>
+                  <a:ext uri="{FF2B5EF4-FFF2-40B4-BE49-F238E27FC236}">
+                    <a16:creationId xmlns:a16="http://schemas.microsoft.com/office/drawing/2014/main" id="{79C3E032-99B7-C7C2-7589-20C4769A1D7D}"/>
+                  </a:ext>
+                </a:extLst>
+              </p:cNvPr>
+              <p:cNvSpPr/>
+              <p:nvPr/>
+            </p:nvSpPr>
+            <p:spPr>
+              <a:xfrm>
+                <a:off x="4463845" y="4960376"/>
+                <a:ext cx="2222090" cy="825910"/>
+              </a:xfrm>
+              <a:prstGeom prst="rect">
+                <a:avLst/>
+              </a:prstGeom>
+            </p:spPr>
+            <p:style>
+              <a:lnRef idx="1">
+                <a:schemeClr val="accent4"/>
+              </a:lnRef>
+              <a:fillRef idx="2">
+                <a:schemeClr val="accent4"/>
+              </a:fillRef>
+              <a:effectRef idx="1">
+                <a:schemeClr val="accent4"/>
+              </a:effectRef>
+              <a:fontRef idx="minor">
+                <a:schemeClr val="dk1"/>
+              </a:fontRef>
+            </p:style>
+            <p:txBody>
+              <a:bodyPr rtlCol="0" anchor="ctr"/>
+              <a:lstStyle/>
+              <a:p>
+                <a:pPr algn="ctr"/>
+                <a:r>
+                  <a:rPr lang="en-IN" dirty="0">
+                    <a:latin typeface="LM Roman 10" panose="00000500000000000000" pitchFamily="50" charset="0"/>
+                  </a:rPr>
+                  <a:t>Calculate </a:t>
+                </a:r>
+              </a:p>
+              <a:p>
+                <a:pPr algn="ctr"/>
+                <a14:m>
+                  <m:oMathPara xmlns:m="http://schemas.openxmlformats.org/officeDocument/2006/math">
+                    <m:oMathParaPr>
+                      <m:jc m:val="centerGroup"/>
+                    </m:oMathParaPr>
+                    <m:oMath xmlns:m="http://schemas.openxmlformats.org/officeDocument/2006/math">
+                      <m:r>
+                        <a:rPr lang="en-IN" b="0" i="1" smtClean="0">
+                          <a:latin typeface="Cambria Math" panose="02040503050406030204" pitchFamily="18" charset="0"/>
+                        </a:rPr>
+                        <m:t>𝑑</m:t>
+                      </m:r>
+                      <m:r>
+                        <a:rPr lang="en-IN" b="0" i="1" smtClean="0">
+                          <a:latin typeface="Cambria Math" panose="02040503050406030204" pitchFamily="18" charset="0"/>
+                        </a:rPr>
+                        <m:t>=</m:t>
+                      </m:r>
+                      <m:sSub>
+                        <m:sSubPr>
+                          <m:ctrlPr>
+                            <a:rPr lang="en-IN" b="0" i="1" smtClean="0">
+                              <a:latin typeface="Cambria Math" panose="02040503050406030204" pitchFamily="18" charset="0"/>
+                            </a:rPr>
+                          </m:ctrlPr>
+                        </m:sSubPr>
+                        <m:e>
+                          <m:r>
+                            <a:rPr lang="en-IN" b="0" i="1" smtClean="0">
+                              <a:latin typeface="Cambria Math" panose="02040503050406030204" pitchFamily="18" charset="0"/>
+                            </a:rPr>
+                            <m:t>𝑣</m:t>
+                          </m:r>
+                        </m:e>
+                        <m:sub>
+                          <m:r>
+                            <a:rPr lang="en-IN" b="0" i="1" smtClean="0">
+                              <a:latin typeface="Cambria Math" panose="02040503050406030204" pitchFamily="18" charset="0"/>
+                            </a:rPr>
+                            <m:t>𝑢𝑙𝑡𝑟𝑎𝑠𝑜𝑛𝑖𝑐</m:t>
+                          </m:r>
+                        </m:sub>
+                      </m:sSub>
+                      <m:r>
+                        <a:rPr lang="en-IN" b="0" i="1" smtClean="0">
+                          <a:latin typeface="Cambria Math" panose="02040503050406030204" pitchFamily="18" charset="0"/>
+                        </a:rPr>
+                        <m:t> ∗</m:t>
+                      </m:r>
+                      <m:f>
+                        <m:fPr>
+                          <m:ctrlPr>
+                            <a:rPr lang="en-IN" b="0" i="1" smtClean="0">
+                              <a:latin typeface="Cambria Math" panose="02040503050406030204" pitchFamily="18" charset="0"/>
+                            </a:rPr>
+                          </m:ctrlPr>
+                        </m:fPr>
+                        <m:num>
+                          <m:r>
+                            <a:rPr lang="en-IN" b="0" i="1" smtClean="0">
+                              <a:latin typeface="Cambria Math" panose="02040503050406030204" pitchFamily="18" charset="0"/>
+                            </a:rPr>
+                            <m:t>𝑡</m:t>
+                          </m:r>
+                        </m:num>
+                        <m:den>
+                          <m:r>
+                            <a:rPr lang="en-IN" b="0" i="1" smtClean="0">
+                              <a:latin typeface="Cambria Math" panose="02040503050406030204" pitchFamily="18" charset="0"/>
+                            </a:rPr>
+                            <m:t>2</m:t>
+                          </m:r>
+                        </m:den>
+                      </m:f>
+                    </m:oMath>
+                  </m:oMathPara>
+                </a14:m>
+                <a:endParaRPr lang="en-IN" dirty="0">
+                  <a:latin typeface="LM Roman 10" panose="00000500000000000000" pitchFamily="50" charset="0"/>
+                </a:endParaRPr>
+              </a:p>
+            </p:txBody>
+          </p:sp>
+        </mc:Choice>
+        <mc:Fallback>
+          <p:sp>
+            <p:nvSpPr>
+              <p:cNvPr id="7" name="Rectangle 6">
+                <a:extLst>
+                  <a:ext uri="{FF2B5EF4-FFF2-40B4-BE49-F238E27FC236}">
+                    <a16:creationId xmlns:a16="http://schemas.microsoft.com/office/drawing/2014/main" id="{79C3E032-99B7-C7C2-7589-20C4769A1D7D}"/>
+                  </a:ext>
+                </a:extLst>
+              </p:cNvPr>
+              <p:cNvSpPr>
+                <a:spLocks noRot="1" noChangeAspect="1" noMove="1" noResize="1" noEditPoints="1" noAdjustHandles="1" noChangeArrowheads="1" noChangeShapeType="1" noTextEdit="1"/>
+              </p:cNvSpPr>
+              <p:nvPr/>
+            </p:nvSpPr>
+            <p:spPr>
+              <a:xfrm>
+                <a:off x="4463845" y="4960376"/>
+                <a:ext cx="2222090" cy="825910"/>
+              </a:xfrm>
+              <a:prstGeom prst="rect">
+                <a:avLst/>
+              </a:prstGeom>
+              <a:blipFill>
+                <a:blip r:embed="rId3"/>
+                <a:stretch>
+                  <a:fillRect t="-6618"/>
+                </a:stretch>
+              </a:blipFill>
+            </p:spPr>
+            <p:txBody>
+              <a:bodyPr/>
+              <a:lstStyle/>
+              <a:p>
+                <a:r>
+                  <a:rPr lang="en-IN">
+                    <a:noFill/>
+                  </a:rPr>
+                  <a:t> </a:t>
+                </a:r>
+              </a:p>
+            </p:txBody>
+          </p:sp>
+        </mc:Fallback>
+      </mc:AlternateContent>
+      <p:sp>
+        <p:nvSpPr>
+          <p:cNvPr id="8" name="Rectangle 7">
+            <a:extLst>
+              <a:ext uri="{FF2B5EF4-FFF2-40B4-BE49-F238E27FC236}">
+                <a16:creationId xmlns:a16="http://schemas.microsoft.com/office/drawing/2014/main" id="{DAE4F494-ABEE-7D05-BB9D-483E5830D5B1}"/>
+              </a:ext>
+            </a:extLst>
+          </p:cNvPr>
+          <p:cNvSpPr/>
+          <p:nvPr/>
+        </p:nvSpPr>
+        <p:spPr>
+          <a:xfrm>
+            <a:off x="4463845" y="6037022"/>
+            <a:ext cx="2222090" cy="560439"/>
+          </a:xfrm>
+          <a:prstGeom prst="rect">
+            <a:avLst/>
+          </a:prstGeom>
+        </p:spPr>
+        <p:style>
+          <a:lnRef idx="1">
+            <a:schemeClr val="accent4"/>
+          </a:lnRef>
+          <a:fillRef idx="2">
+            <a:schemeClr val="accent4"/>
+          </a:fillRef>
+          <a:effectRef idx="1">
+            <a:schemeClr val="accent4"/>
+          </a:effectRef>
+          <a:fontRef idx="minor">
+            <a:schemeClr val="dk1"/>
+          </a:fontRef>
+        </p:style>
+        <p:txBody>
+          <a:bodyPr rtlCol="0" anchor="ctr"/>
+          <a:lstStyle/>
+          <a:p>
+            <a:pPr algn="ctr"/>
+            <a:r>
+              <a:rPr lang="en-IN" dirty="0">
+                <a:latin typeface="LM Roman 10" panose="00000500000000000000" pitchFamily="50" charset="0"/>
+              </a:rPr>
+              <a:t>Output to PC</a:t>
+            </a:r>
+          </a:p>
+        </p:txBody>
+      </p:sp>
+      <p:sp>
+        <p:nvSpPr>
+          <p:cNvPr id="9" name="Oval 8">
+            <a:extLst>
+              <a:ext uri="{FF2B5EF4-FFF2-40B4-BE49-F238E27FC236}">
+                <a16:creationId xmlns:a16="http://schemas.microsoft.com/office/drawing/2014/main" id="{F2DDA2F2-9EE7-10D0-837B-BD5DB70CEECD}"/>
+              </a:ext>
+            </a:extLst>
+          </p:cNvPr>
+          <p:cNvSpPr/>
+          <p:nvPr/>
+        </p:nvSpPr>
+        <p:spPr>
+          <a:xfrm>
+            <a:off x="91572" y="296722"/>
+            <a:ext cx="1646902" cy="1549956"/>
+          </a:xfrm>
+          <a:prstGeom prst="ellipse">
+            <a:avLst/>
+          </a:prstGeom>
+        </p:spPr>
+        <p:style>
+          <a:lnRef idx="1">
+            <a:schemeClr val="accent2"/>
+          </a:lnRef>
+          <a:fillRef idx="2">
+            <a:schemeClr val="accent2"/>
+          </a:fillRef>
+          <a:effectRef idx="1">
+            <a:schemeClr val="accent2"/>
+          </a:effectRef>
+          <a:fontRef idx="minor">
+            <a:schemeClr val="dk1"/>
+          </a:fontRef>
+        </p:style>
+        <p:txBody>
+          <a:bodyPr rtlCol="0" anchor="ctr"/>
+          <a:lstStyle/>
+          <a:p>
+            <a:pPr algn="ctr"/>
+            <a:r>
+              <a:rPr lang="en-IN" dirty="0">
+                <a:latin typeface="LM Roman 10" panose="00000500000000000000" pitchFamily="50" charset="0"/>
+              </a:rPr>
+              <a:t>Alternate between F/R</a:t>
+            </a:r>
+          </a:p>
+        </p:txBody>
+      </p:sp>
+      <p:cxnSp>
+        <p:nvCxnSpPr>
+          <p:cNvPr id="11" name="Straight Arrow Connector 10">
+            <a:extLst>
+              <a:ext uri="{FF2B5EF4-FFF2-40B4-BE49-F238E27FC236}">
+                <a16:creationId xmlns:a16="http://schemas.microsoft.com/office/drawing/2014/main" id="{D2F3A1DD-E745-33EF-19BC-0F498F560BDB}"/>
+              </a:ext>
+            </a:extLst>
+          </p:cNvPr>
+          <p:cNvCxnSpPr>
+            <a:cxnSpLocks/>
+            <a:stCxn id="2" idx="2"/>
+            <a:endCxn id="4" idx="0"/>
+          </p:cNvCxnSpPr>
+          <p:nvPr/>
+        </p:nvCxnSpPr>
+        <p:spPr>
+          <a:xfrm>
+            <a:off x="5574890" y="727585"/>
+            <a:ext cx="0" cy="344129"/>
+          </a:xfrm>
+          <a:prstGeom prst="straightConnector1">
+            <a:avLst/>
+          </a:prstGeom>
+          <a:ln>
+            <a:tailEnd type="triangle"/>
+          </a:ln>
+        </p:spPr>
+        <p:style>
+          <a:lnRef idx="1">
+            <a:schemeClr val="dk1"/>
+          </a:lnRef>
+          <a:fillRef idx="0">
+            <a:schemeClr val="dk1"/>
+          </a:fillRef>
+          <a:effectRef idx="0">
+            <a:schemeClr val="dk1"/>
+          </a:effectRef>
+          <a:fontRef idx="minor">
+            <a:schemeClr val="tx1"/>
+          </a:fontRef>
+        </p:style>
+      </p:cxnSp>
+      <p:cxnSp>
+        <p:nvCxnSpPr>
+          <p:cNvPr id="13" name="Straight Arrow Connector 12">
+            <a:extLst>
+              <a:ext uri="{FF2B5EF4-FFF2-40B4-BE49-F238E27FC236}">
+                <a16:creationId xmlns:a16="http://schemas.microsoft.com/office/drawing/2014/main" id="{34CFEBF1-EF07-6A29-091E-9EF3C7628410}"/>
+              </a:ext>
+            </a:extLst>
+          </p:cNvPr>
+          <p:cNvCxnSpPr>
+            <a:cxnSpLocks/>
+            <a:stCxn id="43" idx="2"/>
+            <a:endCxn id="5" idx="0"/>
+          </p:cNvCxnSpPr>
+          <p:nvPr/>
+        </p:nvCxnSpPr>
+        <p:spPr>
+          <a:xfrm>
+            <a:off x="5574890" y="3141402"/>
+            <a:ext cx="0" cy="575197"/>
+          </a:xfrm>
+          <a:prstGeom prst="straightConnector1">
+            <a:avLst/>
+          </a:prstGeom>
+          <a:ln>
+            <a:tailEnd type="triangle"/>
+          </a:ln>
+        </p:spPr>
+        <p:style>
+          <a:lnRef idx="1">
+            <a:schemeClr val="dk1"/>
+          </a:lnRef>
+          <a:fillRef idx="0">
+            <a:schemeClr val="dk1"/>
+          </a:fillRef>
+          <a:effectRef idx="0">
+            <a:schemeClr val="dk1"/>
+          </a:effectRef>
+          <a:fontRef idx="minor">
+            <a:schemeClr val="tx1"/>
+          </a:fontRef>
+        </p:style>
+      </p:cxnSp>
+      <p:cxnSp>
+        <p:nvCxnSpPr>
+          <p:cNvPr id="16" name="Straight Arrow Connector 15">
+            <a:extLst>
+              <a:ext uri="{FF2B5EF4-FFF2-40B4-BE49-F238E27FC236}">
+                <a16:creationId xmlns:a16="http://schemas.microsoft.com/office/drawing/2014/main" id="{01CF37ED-BA61-785D-8FFB-9595FBB72F82}"/>
+              </a:ext>
+            </a:extLst>
+          </p:cNvPr>
+          <p:cNvCxnSpPr>
+            <a:cxnSpLocks/>
+            <a:stCxn id="5" idx="2"/>
+            <a:endCxn id="7" idx="0"/>
+          </p:cNvCxnSpPr>
+          <p:nvPr/>
+        </p:nvCxnSpPr>
+        <p:spPr>
+          <a:xfrm>
+            <a:off x="5574890" y="4370431"/>
+            <a:ext cx="0" cy="589945"/>
+          </a:xfrm>
+          <a:prstGeom prst="straightConnector1">
+            <a:avLst/>
+          </a:prstGeom>
+          <a:ln>
+            <a:tailEnd type="triangle"/>
+          </a:ln>
+        </p:spPr>
+        <p:style>
+          <a:lnRef idx="1">
+            <a:schemeClr val="dk1"/>
+          </a:lnRef>
+          <a:fillRef idx="0">
+            <a:schemeClr val="dk1"/>
+          </a:fillRef>
+          <a:effectRef idx="0">
+            <a:schemeClr val="dk1"/>
+          </a:effectRef>
+          <a:fontRef idx="minor">
+            <a:schemeClr val="tx1"/>
+          </a:fontRef>
+        </p:style>
+      </p:cxnSp>
+      <p:cxnSp>
+        <p:nvCxnSpPr>
+          <p:cNvPr id="19" name="Straight Arrow Connector 18">
+            <a:extLst>
+              <a:ext uri="{FF2B5EF4-FFF2-40B4-BE49-F238E27FC236}">
+                <a16:creationId xmlns:a16="http://schemas.microsoft.com/office/drawing/2014/main" id="{B85B0B4E-39AF-7693-8DC4-7EEA14999F0B}"/>
+              </a:ext>
+            </a:extLst>
+          </p:cNvPr>
+          <p:cNvCxnSpPr>
+            <a:cxnSpLocks/>
+            <a:stCxn id="7" idx="2"/>
+            <a:endCxn id="8" idx="0"/>
+          </p:cNvCxnSpPr>
+          <p:nvPr/>
+        </p:nvCxnSpPr>
+        <p:spPr>
+          <a:xfrm>
+            <a:off x="5574890" y="5786286"/>
+            <a:ext cx="0" cy="250736"/>
+          </a:xfrm>
+          <a:prstGeom prst="straightConnector1">
+            <a:avLst/>
+          </a:prstGeom>
+          <a:ln>
+            <a:tailEnd type="triangle"/>
+          </a:ln>
+        </p:spPr>
+        <p:style>
+          <a:lnRef idx="1">
+            <a:schemeClr val="dk1"/>
+          </a:lnRef>
+          <a:fillRef idx="0">
+            <a:schemeClr val="dk1"/>
+          </a:fillRef>
+          <a:effectRef idx="0">
+            <a:schemeClr val="dk1"/>
+          </a:effectRef>
+          <a:fontRef idx="minor">
+            <a:schemeClr val="tx1"/>
+          </a:fontRef>
+        </p:style>
+      </p:cxnSp>
+      <p:cxnSp>
+        <p:nvCxnSpPr>
+          <p:cNvPr id="24" name="Connector: Elbow 23">
+            <a:extLst>
+              <a:ext uri="{FF2B5EF4-FFF2-40B4-BE49-F238E27FC236}">
+                <a16:creationId xmlns:a16="http://schemas.microsoft.com/office/drawing/2014/main" id="{29FABF27-FAED-C8CF-D19C-8B4FFA6B98CC}"/>
+              </a:ext>
+            </a:extLst>
+          </p:cNvPr>
+          <p:cNvCxnSpPr>
+            <a:cxnSpLocks/>
+            <a:stCxn id="43" idx="2"/>
+            <a:endCxn id="6" idx="0"/>
+          </p:cNvCxnSpPr>
+          <p:nvPr/>
+        </p:nvCxnSpPr>
+        <p:spPr>
+          <a:xfrm rot="16200000" flipH="1">
+            <a:off x="6679790" y="2036502"/>
+            <a:ext cx="341673" cy="2551472"/>
+          </a:xfrm>
+          <a:prstGeom prst="bentConnector3">
+            <a:avLst>
+              <a:gd name="adj1" fmla="val 50000"/>
+            </a:avLst>
+          </a:prstGeom>
+          <a:ln>
+            <a:tailEnd type="triangle"/>
+          </a:ln>
+        </p:spPr>
+        <p:style>
+          <a:lnRef idx="1">
+            <a:schemeClr val="dk1"/>
+          </a:lnRef>
+          <a:fillRef idx="0">
+            <a:schemeClr val="dk1"/>
+          </a:fillRef>
+          <a:effectRef idx="0">
+            <a:schemeClr val="dk1"/>
+          </a:effectRef>
+          <a:fontRef idx="minor">
+            <a:schemeClr val="tx1"/>
+          </a:fontRef>
+        </p:style>
+      </p:cxnSp>
+      <mc:AlternateContent xmlns:mc="http://schemas.openxmlformats.org/markup-compatibility/2006">
+        <mc:Choice xmlns:a14="http://schemas.microsoft.com/office/drawing/2010/main" Requires="a14">
+          <p:sp>
+            <p:nvSpPr>
+              <p:cNvPr id="42" name="Rectangle 41">
+                <a:extLst>
+                  <a:ext uri="{FF2B5EF4-FFF2-40B4-BE49-F238E27FC236}">
+                    <a16:creationId xmlns:a16="http://schemas.microsoft.com/office/drawing/2014/main" id="{AF7E4BF8-E158-49FC-99E0-6A8A801DE500}"/>
+                  </a:ext>
+                </a:extLst>
+              </p:cNvPr>
+              <p:cNvSpPr/>
+              <p:nvPr/>
+            </p:nvSpPr>
+            <p:spPr>
+              <a:xfrm>
+                <a:off x="4463845" y="1814045"/>
+                <a:ext cx="2222090" cy="560439"/>
+              </a:xfrm>
+              <a:prstGeom prst="rect">
+                <a:avLst/>
+              </a:prstGeom>
+            </p:spPr>
+            <p:style>
+              <a:lnRef idx="1">
+                <a:schemeClr val="accent4"/>
+              </a:lnRef>
+              <a:fillRef idx="2">
+                <a:schemeClr val="accent4"/>
+              </a:fillRef>
+              <a:effectRef idx="1">
+                <a:schemeClr val="accent4"/>
+              </a:effectRef>
+              <a:fontRef idx="minor">
+                <a:schemeClr val="dk1"/>
+              </a:fontRef>
+            </p:style>
+            <p:txBody>
+              <a:bodyPr rtlCol="0" anchor="ctr"/>
+              <a:lstStyle/>
+              <a:p>
+                <a:pPr algn="ctr"/>
+                <a:r>
+                  <a:rPr lang="en-IN" dirty="0">
+                    <a:latin typeface="LM Roman 10" panose="00000500000000000000" pitchFamily="50" charset="0"/>
+                  </a:rPr>
+                  <a:t>Wait(10</a:t>
+                </a:r>
+                <a14:m>
+                  <m:oMath xmlns:m="http://schemas.openxmlformats.org/officeDocument/2006/math">
+                    <m:r>
+                      <a:rPr lang="en-IN" b="0" i="1" dirty="0" smtClean="0">
+                        <a:latin typeface="Cambria Math" panose="02040503050406030204" pitchFamily="18" charset="0"/>
+                      </a:rPr>
+                      <m:t>𝜇</m:t>
+                    </m:r>
+                  </m:oMath>
+                </a14:m>
+                <a:r>
+                  <a:rPr lang="en-IN" dirty="0">
+                    <a:latin typeface="LM Roman 10" panose="00000500000000000000" pitchFamily="50" charset="0"/>
+                  </a:rPr>
+                  <a:t>s)</a:t>
+                </a:r>
+              </a:p>
+            </p:txBody>
+          </p:sp>
+        </mc:Choice>
+        <mc:Fallback>
+          <p:sp>
+            <p:nvSpPr>
+              <p:cNvPr id="42" name="Rectangle 41">
+                <a:extLst>
+                  <a:ext uri="{FF2B5EF4-FFF2-40B4-BE49-F238E27FC236}">
+                    <a16:creationId xmlns:a16="http://schemas.microsoft.com/office/drawing/2014/main" id="{AF7E4BF8-E158-49FC-99E0-6A8A801DE500}"/>
+                  </a:ext>
+                </a:extLst>
+              </p:cNvPr>
+              <p:cNvSpPr>
+                <a:spLocks noRot="1" noChangeAspect="1" noMove="1" noResize="1" noEditPoints="1" noAdjustHandles="1" noChangeArrowheads="1" noChangeShapeType="1" noTextEdit="1"/>
+              </p:cNvSpPr>
+              <p:nvPr/>
+            </p:nvSpPr>
+            <p:spPr>
+              <a:xfrm>
+                <a:off x="4463845" y="1814045"/>
+                <a:ext cx="2222090" cy="560439"/>
+              </a:xfrm>
+              <a:prstGeom prst="rect">
+                <a:avLst/>
+              </a:prstGeom>
+              <a:blipFill>
+                <a:blip r:embed="rId4"/>
+                <a:stretch>
+                  <a:fillRect/>
+                </a:stretch>
+              </a:blipFill>
+            </p:spPr>
+            <p:txBody>
+              <a:bodyPr/>
+              <a:lstStyle/>
+              <a:p>
+                <a:r>
+                  <a:rPr lang="en-IN">
+                    <a:noFill/>
+                  </a:rPr>
+                  <a:t> </a:t>
+                </a:r>
+              </a:p>
+            </p:txBody>
+          </p:sp>
+        </mc:Fallback>
+      </mc:AlternateContent>
+      <p:sp>
+        <p:nvSpPr>
+          <p:cNvPr id="43" name="Rectangle 42">
+            <a:extLst>
+              <a:ext uri="{FF2B5EF4-FFF2-40B4-BE49-F238E27FC236}">
+                <a16:creationId xmlns:a16="http://schemas.microsoft.com/office/drawing/2014/main" id="{6585A631-50D3-DDB1-AE6F-906CEF5F91DD}"/>
+              </a:ext>
+            </a:extLst>
+          </p:cNvPr>
+          <p:cNvSpPr/>
+          <p:nvPr/>
+        </p:nvSpPr>
+        <p:spPr>
+          <a:xfrm>
+            <a:off x="4463845" y="2580963"/>
+            <a:ext cx="2222090" cy="560439"/>
+          </a:xfrm>
+          <a:prstGeom prst="rect">
+            <a:avLst/>
+          </a:prstGeom>
+        </p:spPr>
+        <p:style>
+          <a:lnRef idx="1">
+            <a:schemeClr val="accent4"/>
+          </a:lnRef>
+          <a:fillRef idx="2">
+            <a:schemeClr val="accent4"/>
+          </a:fillRef>
+          <a:effectRef idx="1">
+            <a:schemeClr val="accent4"/>
+          </a:effectRef>
+          <a:fontRef idx="minor">
+            <a:schemeClr val="dk1"/>
+          </a:fontRef>
+        </p:style>
+        <p:txBody>
+          <a:bodyPr rtlCol="0" anchor="ctr"/>
+          <a:lstStyle/>
+          <a:p>
+            <a:pPr algn="ctr"/>
+            <a:r>
+              <a:rPr lang="en-IN" dirty="0">
+                <a:latin typeface="LM Mono 10" panose="00000509000000000000" pitchFamily="49" charset="0"/>
+              </a:rPr>
+              <a:t>Trig</a:t>
+            </a:r>
+            <a:r>
+              <a:rPr lang="en-IN" dirty="0">
+                <a:latin typeface="LM Roman 10" panose="00000500000000000000" pitchFamily="50" charset="0"/>
+              </a:rPr>
+              <a:t> = 0</a:t>
+            </a:r>
+          </a:p>
+        </p:txBody>
+      </p:sp>
+      <p:cxnSp>
+        <p:nvCxnSpPr>
+          <p:cNvPr id="44" name="Straight Arrow Connector 43">
+            <a:extLst>
+              <a:ext uri="{FF2B5EF4-FFF2-40B4-BE49-F238E27FC236}">
+                <a16:creationId xmlns:a16="http://schemas.microsoft.com/office/drawing/2014/main" id="{E3E48F48-E68B-561F-50C2-3FF55A2AC1EE}"/>
+              </a:ext>
+            </a:extLst>
+          </p:cNvPr>
+          <p:cNvCxnSpPr>
+            <a:cxnSpLocks/>
+            <a:stCxn id="4" idx="2"/>
+            <a:endCxn id="42" idx="0"/>
+          </p:cNvCxnSpPr>
+          <p:nvPr/>
+        </p:nvCxnSpPr>
+        <p:spPr>
+          <a:xfrm>
+            <a:off x="5574890" y="1632153"/>
+            <a:ext cx="0" cy="181892"/>
+          </a:xfrm>
+          <a:prstGeom prst="straightConnector1">
+            <a:avLst/>
+          </a:prstGeom>
+          <a:ln>
+            <a:tailEnd type="triangle"/>
+          </a:ln>
+        </p:spPr>
+        <p:style>
+          <a:lnRef idx="1">
+            <a:schemeClr val="dk1"/>
+          </a:lnRef>
+          <a:fillRef idx="0">
+            <a:schemeClr val="dk1"/>
+          </a:fillRef>
+          <a:effectRef idx="0">
+            <a:schemeClr val="dk1"/>
+          </a:effectRef>
+          <a:fontRef idx="minor">
+            <a:schemeClr val="tx1"/>
+          </a:fontRef>
+        </p:style>
+      </p:cxnSp>
+      <p:cxnSp>
+        <p:nvCxnSpPr>
+          <p:cNvPr id="47" name="Straight Arrow Connector 46">
+            <a:extLst>
+              <a:ext uri="{FF2B5EF4-FFF2-40B4-BE49-F238E27FC236}">
+                <a16:creationId xmlns:a16="http://schemas.microsoft.com/office/drawing/2014/main" id="{46FE0299-AA5C-B01D-7225-3C80A27C21CF}"/>
+              </a:ext>
+            </a:extLst>
+          </p:cNvPr>
+          <p:cNvCxnSpPr>
+            <a:cxnSpLocks/>
+            <a:stCxn id="42" idx="2"/>
+            <a:endCxn id="43" idx="0"/>
+          </p:cNvCxnSpPr>
+          <p:nvPr/>
+        </p:nvCxnSpPr>
+        <p:spPr>
+          <a:xfrm>
+            <a:off x="5574890" y="2374484"/>
+            <a:ext cx="0" cy="206479"/>
+          </a:xfrm>
+          <a:prstGeom prst="straightConnector1">
+            <a:avLst/>
+          </a:prstGeom>
+          <a:ln>
+            <a:tailEnd type="triangle"/>
+          </a:ln>
+        </p:spPr>
+        <p:style>
+          <a:lnRef idx="1">
+            <a:schemeClr val="dk1"/>
+          </a:lnRef>
+          <a:fillRef idx="0">
+            <a:schemeClr val="dk1"/>
+          </a:fillRef>
+          <a:effectRef idx="0">
+            <a:schemeClr val="dk1"/>
+          </a:effectRef>
+          <a:fontRef idx="minor">
+            <a:schemeClr val="tx1"/>
+          </a:fontRef>
+        </p:style>
+      </p:cxnSp>
+      <p:cxnSp>
+        <p:nvCxnSpPr>
+          <p:cNvPr id="76" name="Connector: Elbow 75">
+            <a:extLst>
+              <a:ext uri="{FF2B5EF4-FFF2-40B4-BE49-F238E27FC236}">
+                <a16:creationId xmlns:a16="http://schemas.microsoft.com/office/drawing/2014/main" id="{72D8B2E1-A22D-A41D-4EC1-AA223C7F6E77}"/>
+              </a:ext>
+            </a:extLst>
+          </p:cNvPr>
+          <p:cNvCxnSpPr>
+            <a:cxnSpLocks/>
+            <a:stCxn id="6" idx="2"/>
+          </p:cNvCxnSpPr>
+          <p:nvPr/>
+        </p:nvCxnSpPr>
+        <p:spPr>
+          <a:xfrm rot="5400000">
+            <a:off x="6786716" y="3252019"/>
+            <a:ext cx="127820" cy="2551472"/>
+          </a:xfrm>
+          <a:prstGeom prst="bentConnector2">
+            <a:avLst/>
+          </a:prstGeom>
+          <a:ln>
+            <a:tailEnd type="triangle"/>
+          </a:ln>
+        </p:spPr>
+        <p:style>
+          <a:lnRef idx="1">
+            <a:schemeClr val="dk1"/>
+          </a:lnRef>
+          <a:fillRef idx="0">
+            <a:schemeClr val="dk1"/>
+          </a:fillRef>
+          <a:effectRef idx="0">
+            <a:schemeClr val="dk1"/>
+          </a:effectRef>
+          <a:fontRef idx="minor">
+            <a:schemeClr val="tx1"/>
+          </a:fontRef>
+        </p:style>
+      </p:cxnSp>
+      <p:sp>
+        <p:nvSpPr>
+          <p:cNvPr id="79" name="TextBox 78">
+            <a:extLst>
+              <a:ext uri="{FF2B5EF4-FFF2-40B4-BE49-F238E27FC236}">
+                <a16:creationId xmlns:a16="http://schemas.microsoft.com/office/drawing/2014/main" id="{02F7D44B-FEBD-4E68-4EC8-AD046A0321F6}"/>
+              </a:ext>
+            </a:extLst>
+          </p:cNvPr>
+          <p:cNvSpPr txBox="1"/>
+          <p:nvPr/>
+        </p:nvSpPr>
+        <p:spPr>
+          <a:xfrm>
+            <a:off x="5574890" y="4591355"/>
+            <a:ext cx="2377574" cy="369332"/>
+          </a:xfrm>
+          <a:prstGeom prst="rect">
+            <a:avLst/>
+          </a:prstGeom>
+          <a:noFill/>
+        </p:spPr>
+        <p:txBody>
+          <a:bodyPr wrap="none" rtlCol="0">
+            <a:spAutoFit/>
+          </a:bodyPr>
+          <a:lstStyle/>
+          <a:p>
+            <a:r>
+              <a:rPr lang="en-IN" dirty="0">
+                <a:latin typeface="LM Mono 10" panose="00000509000000000000" pitchFamily="49" charset="0"/>
+              </a:rPr>
+              <a:t> count &lt;= </a:t>
+            </a:r>
+            <a:r>
+              <a:rPr lang="en-IN" dirty="0" err="1">
+                <a:latin typeface="LM Mono 10" panose="00000509000000000000" pitchFamily="49" charset="0"/>
+              </a:rPr>
+              <a:t>count_max</a:t>
+            </a:r>
+            <a:endParaRPr lang="en-IN" dirty="0">
+              <a:latin typeface="LM Mono 10" panose="00000509000000000000" pitchFamily="49" charset="0"/>
+            </a:endParaRPr>
+          </a:p>
+        </p:txBody>
+      </p:sp>
+      <p:cxnSp>
+        <p:nvCxnSpPr>
+          <p:cNvPr id="81" name="Connector: Elbow 80">
+            <a:extLst>
+              <a:ext uri="{FF2B5EF4-FFF2-40B4-BE49-F238E27FC236}">
+                <a16:creationId xmlns:a16="http://schemas.microsoft.com/office/drawing/2014/main" id="{B1FB677C-691F-87DF-DC9E-516F486DF837}"/>
+              </a:ext>
+            </a:extLst>
+          </p:cNvPr>
+          <p:cNvCxnSpPr>
+            <a:cxnSpLocks/>
+            <a:stCxn id="5" idx="2"/>
+            <a:endCxn id="4" idx="1"/>
+          </p:cNvCxnSpPr>
+          <p:nvPr/>
+        </p:nvCxnSpPr>
+        <p:spPr>
+          <a:xfrm rot="5400000" flipH="1">
+            <a:off x="3510119" y="2305661"/>
+            <a:ext cx="3018497" cy="1111045"/>
+          </a:xfrm>
+          <a:prstGeom prst="bentConnector4">
+            <a:avLst>
+              <a:gd name="adj1" fmla="val -7573"/>
+              <a:gd name="adj2" fmla="val 120575"/>
+            </a:avLst>
+          </a:prstGeom>
+          <a:ln>
+            <a:tailEnd type="triangle"/>
+          </a:ln>
+        </p:spPr>
+        <p:style>
+          <a:lnRef idx="1">
+            <a:schemeClr val="dk1"/>
+          </a:lnRef>
+          <a:fillRef idx="0">
+            <a:schemeClr val="dk1"/>
+          </a:fillRef>
+          <a:effectRef idx="0">
+            <a:schemeClr val="dk1"/>
+          </a:effectRef>
+          <a:fontRef idx="minor">
+            <a:schemeClr val="tx1"/>
+          </a:fontRef>
+        </p:style>
+      </p:cxnSp>
+      <p:sp>
+        <p:nvSpPr>
+          <p:cNvPr id="86" name="TextBox 85">
+            <a:extLst>
+              <a:ext uri="{FF2B5EF4-FFF2-40B4-BE49-F238E27FC236}">
+                <a16:creationId xmlns:a16="http://schemas.microsoft.com/office/drawing/2014/main" id="{FCD257F3-51BB-9D34-CDB3-A27E3741A0ED}"/>
+              </a:ext>
+            </a:extLst>
+          </p:cNvPr>
+          <p:cNvSpPr txBox="1"/>
+          <p:nvPr/>
+        </p:nvSpPr>
+        <p:spPr>
+          <a:xfrm>
+            <a:off x="1912373" y="2772069"/>
+            <a:ext cx="2262158" cy="369332"/>
+          </a:xfrm>
+          <a:prstGeom prst="rect">
+            <a:avLst/>
+          </a:prstGeom>
+          <a:noFill/>
+        </p:spPr>
+        <p:txBody>
+          <a:bodyPr wrap="none" rtlCol="0">
+            <a:spAutoFit/>
+          </a:bodyPr>
+          <a:lstStyle/>
+          <a:p>
+            <a:r>
+              <a:rPr lang="en-IN" dirty="0">
+                <a:latin typeface="LM Mono 10" panose="00000509000000000000" pitchFamily="49" charset="0"/>
+              </a:rPr>
+              <a:t> count &gt; </a:t>
+            </a:r>
+            <a:r>
+              <a:rPr lang="en-IN" dirty="0" err="1">
+                <a:latin typeface="LM Mono 10" panose="00000509000000000000" pitchFamily="49" charset="0"/>
+              </a:rPr>
+              <a:t>count_max</a:t>
+            </a:r>
+            <a:endParaRPr lang="en-IN" dirty="0">
+              <a:latin typeface="LM Mono 10" panose="00000509000000000000" pitchFamily="49" charset="0"/>
+            </a:endParaRPr>
+          </a:p>
+        </p:txBody>
+      </p:sp>
+      <p:cxnSp>
+        <p:nvCxnSpPr>
+          <p:cNvPr id="93" name="Connector: Elbow 92">
+            <a:extLst>
+              <a:ext uri="{FF2B5EF4-FFF2-40B4-BE49-F238E27FC236}">
+                <a16:creationId xmlns:a16="http://schemas.microsoft.com/office/drawing/2014/main" id="{FEDFCCDD-60EF-2313-32C0-78852326928A}"/>
+              </a:ext>
+            </a:extLst>
+          </p:cNvPr>
+          <p:cNvCxnSpPr>
+            <a:cxnSpLocks/>
+            <a:stCxn id="8" idx="2"/>
+            <a:endCxn id="4" idx="3"/>
+          </p:cNvCxnSpPr>
+          <p:nvPr/>
+        </p:nvCxnSpPr>
+        <p:spPr>
+          <a:xfrm rot="5400000" flipH="1" flipV="1">
+            <a:off x="3507648" y="3419175"/>
+            <a:ext cx="5245527" cy="1111045"/>
+          </a:xfrm>
+          <a:prstGeom prst="bentConnector4">
+            <a:avLst>
+              <a:gd name="adj1" fmla="val -4358"/>
+              <a:gd name="adj2" fmla="val 360398"/>
+            </a:avLst>
+          </a:prstGeom>
+          <a:ln>
+            <a:tailEnd type="triangle"/>
+          </a:ln>
+        </p:spPr>
+        <p:style>
+          <a:lnRef idx="1">
+            <a:schemeClr val="dk1"/>
+          </a:lnRef>
+          <a:fillRef idx="0">
+            <a:schemeClr val="dk1"/>
+          </a:fillRef>
+          <a:effectRef idx="0">
+            <a:schemeClr val="dk1"/>
+          </a:effectRef>
+          <a:fontRef idx="minor">
+            <a:schemeClr val="tx1"/>
+          </a:fontRef>
+        </p:style>
+      </p:cxnSp>
+      <p:sp>
+        <p:nvSpPr>
+          <p:cNvPr id="96" name="Arrow: Up-Down 95">
+            <a:extLst>
+              <a:ext uri="{FF2B5EF4-FFF2-40B4-BE49-F238E27FC236}">
+                <a16:creationId xmlns:a16="http://schemas.microsoft.com/office/drawing/2014/main" id="{34D6BF86-1EEE-0A76-58BE-6F5C14750DB1}"/>
+              </a:ext>
+            </a:extLst>
+          </p:cNvPr>
+          <p:cNvSpPr/>
+          <p:nvPr/>
+        </p:nvSpPr>
+        <p:spPr>
+          <a:xfrm>
+            <a:off x="836882" y="1846677"/>
+            <a:ext cx="126680" cy="837617"/>
+          </a:xfrm>
+          <a:prstGeom prst="upDownArrow">
+            <a:avLst/>
+          </a:prstGeom>
+        </p:spPr>
+        <p:style>
+          <a:lnRef idx="1">
+            <a:schemeClr val="dk1"/>
+          </a:lnRef>
+          <a:fillRef idx="2">
+            <a:schemeClr val="dk1"/>
+          </a:fillRef>
+          <a:effectRef idx="1">
+            <a:schemeClr val="dk1"/>
+          </a:effectRef>
+          <a:fontRef idx="minor">
+            <a:schemeClr val="dk1"/>
+          </a:fontRef>
+        </p:style>
+        <p:txBody>
+          <a:bodyPr rtlCol="0" anchor="ctr"/>
+          <a:lstStyle/>
+          <a:p>
+            <a:pPr algn="ctr"/>
+            <a:endParaRPr lang="en-IN" dirty="0"/>
+          </a:p>
+        </p:txBody>
+      </p:sp>
+      <p:sp>
+        <p:nvSpPr>
+          <p:cNvPr id="97" name="Rectangle 96">
+            <a:extLst>
+              <a:ext uri="{FF2B5EF4-FFF2-40B4-BE49-F238E27FC236}">
+                <a16:creationId xmlns:a16="http://schemas.microsoft.com/office/drawing/2014/main" id="{BBBE8908-E357-9C64-FC1A-A721F492756E}"/>
+              </a:ext>
+            </a:extLst>
+          </p:cNvPr>
+          <p:cNvSpPr/>
+          <p:nvPr/>
+        </p:nvSpPr>
+        <p:spPr>
+          <a:xfrm>
+            <a:off x="219392" y="2684294"/>
+            <a:ext cx="1403667" cy="3623091"/>
+          </a:xfrm>
+          <a:prstGeom prst="rect">
+            <a:avLst/>
+          </a:prstGeom>
+        </p:spPr>
+        <p:style>
+          <a:lnRef idx="2">
+            <a:schemeClr val="dk1"/>
+          </a:lnRef>
+          <a:fillRef idx="1">
+            <a:schemeClr val="lt1"/>
+          </a:fillRef>
+          <a:effectRef idx="0">
+            <a:schemeClr val="dk1"/>
+          </a:effectRef>
+          <a:fontRef idx="minor">
+            <a:schemeClr val="dk1"/>
+          </a:fontRef>
+        </p:style>
+        <p:txBody>
+          <a:bodyPr rtlCol="0" anchor="t"/>
+          <a:lstStyle/>
+          <a:p>
+            <a:r>
+              <a:rPr lang="en-IN" sz="1200" dirty="0"/>
+              <a:t>#include&lt;..&gt;</a:t>
+            </a:r>
+          </a:p>
+          <a:p>
+            <a:r>
+              <a:rPr lang="en-IN" sz="1200" dirty="0"/>
+              <a:t>#include&lt;..&gt;</a:t>
+            </a:r>
+          </a:p>
+          <a:p>
+            <a:r>
+              <a:rPr lang="en-IN" sz="1200" dirty="0"/>
+              <a:t>#include&lt;..&gt;</a:t>
+            </a:r>
+          </a:p>
+          <a:p>
+            <a:endParaRPr lang="en-IN" sz="1200" dirty="0"/>
+          </a:p>
+          <a:p>
+            <a:r>
+              <a:rPr lang="en-IN" sz="1200" dirty="0"/>
+              <a:t>void fn1(..);</a:t>
+            </a:r>
+          </a:p>
+          <a:p>
+            <a:r>
+              <a:rPr lang="en-IN" sz="1200" dirty="0"/>
+              <a:t>void fn2(..);</a:t>
+            </a:r>
+          </a:p>
+          <a:p>
+            <a:endParaRPr lang="en-IN" sz="1200" dirty="0"/>
+          </a:p>
+          <a:p>
+            <a:r>
+              <a:rPr lang="en-IN" sz="1200" dirty="0"/>
+              <a:t>void main()</a:t>
+            </a:r>
+          </a:p>
+          <a:p>
+            <a:r>
+              <a:rPr lang="en-IN" sz="1200" dirty="0"/>
+              <a:t>{</a:t>
+            </a:r>
+          </a:p>
+          <a:p>
+            <a:r>
+              <a:rPr lang="en-IN" sz="1200" dirty="0"/>
+              <a:t>…. </a:t>
+            </a:r>
+          </a:p>
+          <a:p>
+            <a:r>
+              <a:rPr lang="en-IN" sz="1200" dirty="0"/>
+              <a:t>   while(1){</a:t>
+            </a:r>
+          </a:p>
+          <a:p>
+            <a:r>
+              <a:rPr lang="en-IN" sz="1200" dirty="0"/>
+              <a:t>       …… </a:t>
+            </a:r>
+          </a:p>
+          <a:p>
+            <a:r>
+              <a:rPr lang="en-IN" sz="1200" dirty="0"/>
+              <a:t>   }</a:t>
+            </a:r>
+          </a:p>
+          <a:p>
+            <a:r>
+              <a:rPr lang="en-IN" sz="1200" dirty="0"/>
+              <a:t>}</a:t>
+            </a:r>
+          </a:p>
+          <a:p>
+            <a:endParaRPr lang="en-IN" sz="1200" dirty="0"/>
+          </a:p>
+          <a:p>
+            <a:r>
+              <a:rPr lang="en-IN" sz="1200" dirty="0"/>
+              <a:t>void fn1(…)</a:t>
+            </a:r>
+          </a:p>
+          <a:p>
+            <a:r>
+              <a:rPr lang="en-IN" sz="1200" dirty="0"/>
+              <a:t>{</a:t>
+            </a:r>
+          </a:p>
+          <a:p>
+            <a:r>
+              <a:rPr lang="en-IN" sz="1200" dirty="0"/>
+              <a:t>}</a:t>
+            </a:r>
+          </a:p>
+          <a:p>
+            <a:r>
+              <a:rPr lang="en-IN" sz="1200" dirty="0"/>
+              <a:t>void fn2(…){ …</a:t>
+            </a:r>
+          </a:p>
+        </p:txBody>
+      </p:sp>
+      <p:sp>
+        <p:nvSpPr>
+          <p:cNvPr id="98" name="TextBox 97">
+            <a:extLst>
+              <a:ext uri="{FF2B5EF4-FFF2-40B4-BE49-F238E27FC236}">
+                <a16:creationId xmlns:a16="http://schemas.microsoft.com/office/drawing/2014/main" id="{10F9A75A-EF58-A8EA-D057-A08215F20AC5}"/>
+              </a:ext>
+            </a:extLst>
+          </p:cNvPr>
+          <p:cNvSpPr txBox="1"/>
+          <p:nvPr/>
+        </p:nvSpPr>
+        <p:spPr>
+          <a:xfrm>
+            <a:off x="966499" y="2061156"/>
+            <a:ext cx="1543949" cy="369332"/>
+          </a:xfrm>
+          <a:prstGeom prst="rect">
+            <a:avLst/>
+          </a:prstGeom>
+          <a:noFill/>
+        </p:spPr>
+        <p:txBody>
+          <a:bodyPr wrap="none" rtlCol="0">
+            <a:spAutoFit/>
+          </a:bodyPr>
+          <a:lstStyle/>
+          <a:p>
+            <a:r>
+              <a:rPr lang="en-IN" i="1" dirty="0">
+                <a:latin typeface="LM Roman 10" panose="00000500000000000000" pitchFamily="50" charset="0"/>
+              </a:rPr>
+              <a:t>via interrupt </a:t>
+            </a:r>
+          </a:p>
+        </p:txBody>
+      </p:sp>
     </p:spTree>
     <p:extLst>
       <p:ext uri="{BB962C8B-B14F-4D97-AF65-F5344CB8AC3E}">

</xml_diff>

<commit_message>
updated README :: SOFTWARE FLOW CHART
</commit_message>
<xml_diff>
--- a/Images/diagrams.pptx
+++ b/Images/diagrams.pptx
@@ -4876,8 +4876,8 @@
           </a:p>
         </p:txBody>
       </p:sp>
-      <mc:AlternateContent xmlns:mc="http://schemas.openxmlformats.org/markup-compatibility/2006">
-        <mc:Choice xmlns:a14="http://schemas.microsoft.com/office/drawing/2010/main" Requires="a14">
+      <mc:AlternateContent xmlns:mc="http://schemas.openxmlformats.org/markup-compatibility/2006" xmlns:a14="http://schemas.microsoft.com/office/drawing/2010/main">
+        <mc:Choice Requires="a14">
           <p:sp>
             <p:nvSpPr>
               <p:cNvPr id="6" name="Rectangle 5">
@@ -4962,7 +4962,7 @@
             </p:txBody>
           </p:sp>
         </mc:Choice>
-        <mc:Fallback>
+        <mc:Fallback xmlns="">
           <p:sp>
             <p:nvSpPr>
               <p:cNvPr id="6" name="Rectangle 5">
@@ -5007,8 +5007,8 @@
           </p:sp>
         </mc:Fallback>
       </mc:AlternateContent>
-      <mc:AlternateContent xmlns:mc="http://schemas.openxmlformats.org/markup-compatibility/2006">
-        <mc:Choice xmlns:a14="http://schemas.microsoft.com/office/drawing/2010/main" Requires="a14">
+      <mc:AlternateContent xmlns:mc="http://schemas.openxmlformats.org/markup-compatibility/2006" xmlns:a14="http://schemas.microsoft.com/office/drawing/2010/main">
+        <mc:Choice Requires="a14">
           <p:sp>
             <p:nvSpPr>
               <p:cNvPr id="7" name="Rectangle 6">
@@ -5142,7 +5142,7 @@
             </p:txBody>
           </p:sp>
         </mc:Choice>
-        <mc:Fallback>
+        <mc:Fallback xmlns="">
           <p:sp>
             <p:nvSpPr>
               <p:cNvPr id="7" name="Rectangle 6">
@@ -5310,6 +5310,9 @@
             <a:avLst/>
           </a:prstGeom>
           <a:ln>
+            <a:solidFill>
+              <a:schemeClr val="bg1"/>
+            </a:solidFill>
             <a:tailEnd type="triangle"/>
           </a:ln>
         </p:spPr>
@@ -5353,6 +5356,9 @@
             <a:avLst/>
           </a:prstGeom>
           <a:ln>
+            <a:solidFill>
+              <a:schemeClr val="bg1"/>
+            </a:solidFill>
             <a:tailEnd type="triangle"/>
           </a:ln>
         </p:spPr>
@@ -5396,6 +5402,9 @@
             <a:avLst/>
           </a:prstGeom>
           <a:ln>
+            <a:solidFill>
+              <a:schemeClr val="bg1"/>
+            </a:solidFill>
             <a:tailEnd type="triangle"/>
           </a:ln>
         </p:spPr>
@@ -5439,6 +5448,9 @@
             <a:avLst/>
           </a:prstGeom>
           <a:ln>
+            <a:solidFill>
+              <a:schemeClr val="bg1"/>
+            </a:solidFill>
             <a:tailEnd type="triangle"/>
           </a:ln>
         </p:spPr>
@@ -5484,6 +5496,9 @@
             </a:avLst>
           </a:prstGeom>
           <a:ln>
+            <a:solidFill>
+              <a:schemeClr val="bg1"/>
+            </a:solidFill>
             <a:tailEnd type="triangle"/>
           </a:ln>
         </p:spPr>
@@ -5502,8 +5517,8 @@
           </a:fontRef>
         </p:style>
       </p:cxnSp>
-      <mc:AlternateContent xmlns:mc="http://schemas.openxmlformats.org/markup-compatibility/2006">
-        <mc:Choice xmlns:a14="http://schemas.microsoft.com/office/drawing/2010/main" Requires="a14">
+      <mc:AlternateContent xmlns:mc="http://schemas.openxmlformats.org/markup-compatibility/2006" xmlns:a14="http://schemas.microsoft.com/office/drawing/2010/main">
+        <mc:Choice Requires="a14">
           <p:sp>
             <p:nvSpPr>
               <p:cNvPr id="42" name="Rectangle 41">
@@ -5570,7 +5585,7 @@
             </p:txBody>
           </p:sp>
         </mc:Choice>
-        <mc:Fallback>
+        <mc:Fallback xmlns="">
           <p:sp>
             <p:nvSpPr>
               <p:cNvPr id="42" name="Rectangle 41">
@@ -5695,6 +5710,9 @@
             <a:avLst/>
           </a:prstGeom>
           <a:ln>
+            <a:solidFill>
+              <a:schemeClr val="bg1"/>
+            </a:solidFill>
             <a:tailEnd type="triangle"/>
           </a:ln>
         </p:spPr>
@@ -5738,6 +5756,9 @@
             <a:avLst/>
           </a:prstGeom>
           <a:ln>
+            <a:solidFill>
+              <a:schemeClr val="bg1"/>
+            </a:solidFill>
             <a:tailEnd type="triangle"/>
           </a:ln>
         </p:spPr>
@@ -5780,6 +5801,9 @@
             <a:avLst/>
           </a:prstGeom>
           <a:ln>
+            <a:solidFill>
+              <a:schemeClr val="bg1"/>
+            </a:solidFill>
             <a:tailEnd type="triangle"/>
           </a:ln>
         </p:spPr>
@@ -5828,17 +5852,26 @@
           <a:p>
             <a:r>
               <a:rPr lang="en-IN" dirty="0">
+                <a:solidFill>
+                  <a:schemeClr val="bg1"/>
+                </a:solidFill>
                 <a:latin typeface="LM Mono 10" panose="00000509000000000000" pitchFamily="49" charset="0"/>
               </a:rPr>
               <a:t> count &lt;= </a:t>
             </a:r>
             <a:r>
               <a:rPr lang="en-IN" dirty="0" err="1">
+                <a:solidFill>
+                  <a:schemeClr val="bg1"/>
+                </a:solidFill>
                 <a:latin typeface="LM Mono 10" panose="00000509000000000000" pitchFamily="49" charset="0"/>
               </a:rPr>
               <a:t>count_max</a:t>
             </a:r>
             <a:endParaRPr lang="en-IN" dirty="0">
+              <a:solidFill>
+                <a:schemeClr val="bg1"/>
+              </a:solidFill>
               <a:latin typeface="LM Mono 10" panose="00000509000000000000" pitchFamily="49" charset="0"/>
             </a:endParaRPr>
           </a:p>
@@ -5872,6 +5905,9 @@
             </a:avLst>
           </a:prstGeom>
           <a:ln>
+            <a:solidFill>
+              <a:schemeClr val="bg1"/>
+            </a:solidFill>
             <a:tailEnd type="triangle"/>
           </a:ln>
         </p:spPr>
@@ -5905,7 +5941,7 @@
         <p:spPr>
           <a:xfrm>
             <a:off x="1912373" y="2772069"/>
-            <a:ext cx="2262158" cy="369332"/>
+            <a:ext cx="2146742" cy="369332"/>
           </a:xfrm>
           <a:prstGeom prst="rect">
             <a:avLst/>
@@ -5920,17 +5956,26 @@
           <a:p>
             <a:r>
               <a:rPr lang="en-IN" dirty="0">
+                <a:solidFill>
+                  <a:schemeClr val="bg1"/>
+                </a:solidFill>
                 <a:latin typeface="LM Mono 10" panose="00000509000000000000" pitchFamily="49" charset="0"/>
               </a:rPr>
-              <a:t> count &gt; </a:t>
+              <a:t> count &gt;</a:t>
             </a:r>
             <a:r>
               <a:rPr lang="en-IN" dirty="0" err="1">
+                <a:solidFill>
+                  <a:schemeClr val="bg1"/>
+                </a:solidFill>
                 <a:latin typeface="LM Mono 10" panose="00000509000000000000" pitchFamily="49" charset="0"/>
               </a:rPr>
               <a:t>count_max</a:t>
             </a:r>
             <a:endParaRPr lang="en-IN" dirty="0">
+              <a:solidFill>
+                <a:schemeClr val="bg1"/>
+              </a:solidFill>
               <a:latin typeface="LM Mono 10" panose="00000509000000000000" pitchFamily="49" charset="0"/>
             </a:endParaRPr>
           </a:p>
@@ -5964,6 +6009,9 @@
             </a:avLst>
           </a:prstGeom>
           <a:ln>
+            <a:solidFill>
+              <a:schemeClr val="bg1"/>
+            </a:solidFill>
             <a:tailEnd type="triangle"/>
           </a:ln>
         </p:spPr>
@@ -6002,6 +6050,14 @@
           <a:prstGeom prst="upDownArrow">
             <a:avLst/>
           </a:prstGeom>
+          <a:solidFill>
+            <a:schemeClr val="bg1"/>
+          </a:solidFill>
+          <a:ln>
+            <a:solidFill>
+              <a:schemeClr val="bg1"/>
+            </a:solidFill>
+          </a:ln>
         </p:spPr>
         <p:style>
           <a:lnRef idx="1">

</xml_diff>